<commit_message>
Clean up and make presentable
</commit_message>
<xml_diff>
--- a/doc/Präsentation.pptx
+++ b/doc/Präsentation.pptx
@@ -109,6 +109,11 @@
       </a:defRPr>
     </a:lvl9pPr>
   </p:defaultTextStyle>
+  <p:extLst>
+    <p:ext uri="{EFAFB233-063F-42B5-8137-9DF3F51BA10A}">
+      <p15:sldGuideLst xmlns:p15="http://schemas.microsoft.com/office/powerpoint/2012/main"/>
+    </p:ext>
+  </p:extLst>
 </p:presentation>
 </file>
 
@@ -189,6 +194,11 @@
               </a:ln>
               <a:effectLst/>
             </c:spPr>
+            <c:extLst>
+              <c:ext xmlns:c16="http://schemas.microsoft.com/office/drawing/2014/chart" uri="{C3380CC4-5D6E-409C-BE32-E72D297353CC}">
+                <c16:uniqueId val="{00000001-456C-425E-A8B0-33A95AD6DFD4}"/>
+              </c:ext>
+            </c:extLst>
           </c:dPt>
           <c:dPt>
             <c:idx val="1"/>
@@ -204,6 +214,11 @@
               </a:ln>
               <a:effectLst/>
             </c:spPr>
+            <c:extLst>
+              <c:ext xmlns:c16="http://schemas.microsoft.com/office/drawing/2014/chart" uri="{C3380CC4-5D6E-409C-BE32-E72D297353CC}">
+                <c16:uniqueId val="{00000003-456C-425E-A8B0-33A95AD6DFD4}"/>
+              </c:ext>
+            </c:extLst>
           </c:dPt>
           <c:dPt>
             <c:idx val="2"/>
@@ -219,6 +234,11 @@
               </a:ln>
               <a:effectLst/>
             </c:spPr>
+            <c:extLst>
+              <c:ext xmlns:c16="http://schemas.microsoft.com/office/drawing/2014/chart" uri="{C3380CC4-5D6E-409C-BE32-E72D297353CC}">
+                <c16:uniqueId val="{00000005-456C-425E-A8B0-33A95AD6DFD4}"/>
+              </c:ext>
+            </c:extLst>
           </c:dPt>
           <c:dPt>
             <c:idx val="3"/>
@@ -234,6 +254,11 @@
               </a:ln>
               <a:effectLst/>
             </c:spPr>
+            <c:extLst>
+              <c:ext xmlns:c16="http://schemas.microsoft.com/office/drawing/2014/chart" uri="{C3380CC4-5D6E-409C-BE32-E72D297353CC}">
+                <c16:uniqueId val="{00000007-456C-425E-A8B0-33A95AD6DFD4}"/>
+              </c:ext>
+            </c:extLst>
           </c:dPt>
           <c:cat>
             <c:strRef>
@@ -1139,7 +1164,7 @@
             <a:fld id="{B61BEF0D-F0BB-DE4B-95CE-6DB70DBA9567}" type="datetimeFigureOut">
               <a:rPr lang="en-US" dirty="0"/>
               <a:pPr/>
-              <a:t>1/25/19</a:t>
+              <a:t>1/25/2019</a:t>
             </a:fld>
             <a:endParaRPr lang="en-US" dirty="0"/>
           </a:p>
@@ -1432,7 +1457,7 @@
             <a:fld id="{B61BEF0D-F0BB-DE4B-95CE-6DB70DBA9567}" type="datetimeFigureOut">
               <a:rPr lang="en-US" dirty="0"/>
               <a:pPr/>
-              <a:t>1/25/19</a:t>
+              <a:t>1/25/2019</a:t>
             </a:fld>
             <a:endParaRPr lang="en-US" dirty="0"/>
           </a:p>
@@ -1693,7 +1718,7 @@
             <a:fld id="{B61BEF0D-F0BB-DE4B-95CE-6DB70DBA9567}" type="datetimeFigureOut">
               <a:rPr lang="en-US" dirty="0"/>
               <a:pPr/>
-              <a:t>1/25/19</a:t>
+              <a:t>1/25/2019</a:t>
             </a:fld>
             <a:endParaRPr lang="en-US" dirty="0"/>
           </a:p>
@@ -2169,7 +2194,7 @@
             <a:fld id="{B61BEF0D-F0BB-DE4B-95CE-6DB70DBA9567}" type="datetimeFigureOut">
               <a:rPr lang="en-US" dirty="0"/>
               <a:pPr/>
-              <a:t>1/25/19</a:t>
+              <a:t>1/25/2019</a:t>
             </a:fld>
             <a:endParaRPr lang="en-US" dirty="0"/>
           </a:p>
@@ -2351,7 +2376,7 @@
             <a:fld id="{B61BEF0D-F0BB-DE4B-95CE-6DB70DBA9567}" type="datetimeFigureOut">
               <a:rPr lang="en-US" dirty="0"/>
               <a:pPr/>
-              <a:t>1/25/19</a:t>
+              <a:t>1/25/2019</a:t>
             </a:fld>
             <a:endParaRPr lang="en-US" dirty="0"/>
           </a:p>
@@ -2934,7 +2959,7 @@
             <a:fld id="{B61BEF0D-F0BB-DE4B-95CE-6DB70DBA9567}" type="datetimeFigureOut">
               <a:rPr lang="en-US" dirty="0"/>
               <a:pPr/>
-              <a:t>1/25/19</a:t>
+              <a:t>1/25/2019</a:t>
             </a:fld>
             <a:endParaRPr lang="en-US" dirty="0"/>
           </a:p>
@@ -3273,7 +3298,7 @@
             <a:fld id="{B61BEF0D-F0BB-DE4B-95CE-6DB70DBA9567}" type="datetimeFigureOut">
               <a:rPr lang="en-US" dirty="0"/>
               <a:pPr/>
-              <a:t>1/25/19</a:t>
+              <a:t>1/25/2019</a:t>
             </a:fld>
             <a:endParaRPr lang="en-US" dirty="0"/>
           </a:p>
@@ -3421,7 +3446,7 @@
             <a:fld id="{B61BEF0D-F0BB-DE4B-95CE-6DB70DBA9567}" type="datetimeFigureOut">
               <a:rPr lang="en-US" dirty="0"/>
               <a:pPr/>
-              <a:t>1/25/19</a:t>
+              <a:t>1/25/2019</a:t>
             </a:fld>
             <a:endParaRPr lang="en-US" dirty="0"/>
           </a:p>
@@ -3574,7 +3599,7 @@
             <a:fld id="{B61BEF0D-F0BB-DE4B-95CE-6DB70DBA9567}" type="datetimeFigureOut">
               <a:rPr lang="en-US" dirty="0"/>
               <a:pPr/>
-              <a:t>1/25/19</a:t>
+              <a:t>1/25/2019</a:t>
             </a:fld>
             <a:endParaRPr lang="en-US" dirty="0"/>
           </a:p>
@@ -3717,7 +3742,7 @@
             <a:fld id="{B61BEF0D-F0BB-DE4B-95CE-6DB70DBA9567}" type="datetimeFigureOut">
               <a:rPr lang="en-US" dirty="0"/>
               <a:pPr/>
-              <a:t>1/25/19</a:t>
+              <a:t>1/25/2019</a:t>
             </a:fld>
             <a:endParaRPr lang="en-US" dirty="0"/>
           </a:p>
@@ -3976,7 +4001,7 @@
             <a:fld id="{B61BEF0D-F0BB-DE4B-95CE-6DB70DBA9567}" type="datetimeFigureOut">
               <a:rPr lang="en-US" dirty="0"/>
               <a:pPr/>
-              <a:t>1/25/19</a:t>
+              <a:t>1/25/2019</a:t>
             </a:fld>
             <a:endParaRPr lang="en-US" dirty="0"/>
           </a:p>
@@ -4217,7 +4242,7 @@
             <a:fld id="{B61BEF0D-F0BB-DE4B-95CE-6DB70DBA9567}" type="datetimeFigureOut">
               <a:rPr lang="en-US" dirty="0"/>
               <a:pPr/>
-              <a:t>1/25/19</a:t>
+              <a:t>1/25/2019</a:t>
             </a:fld>
             <a:endParaRPr lang="en-US" dirty="0"/>
           </a:p>
@@ -4606,7 +4631,7 @@
             <a:fld id="{B61BEF0D-F0BB-DE4B-95CE-6DB70DBA9567}" type="datetimeFigureOut">
               <a:rPr lang="en-US" dirty="0"/>
               <a:pPr/>
-              <a:t>1/25/19</a:t>
+              <a:t>1/25/2019</a:t>
             </a:fld>
             <a:endParaRPr lang="en-US" dirty="0"/>
           </a:p>
@@ -4721,7 +4746,7 @@
             <a:fld id="{B61BEF0D-F0BB-DE4B-95CE-6DB70DBA9567}" type="datetimeFigureOut">
               <a:rPr lang="en-US" dirty="0"/>
               <a:pPr/>
-              <a:t>1/25/19</a:t>
+              <a:t>1/25/2019</a:t>
             </a:fld>
             <a:endParaRPr lang="en-US" dirty="0"/>
           </a:p>
@@ -4813,7 +4838,7 @@
             <a:fld id="{B61BEF0D-F0BB-DE4B-95CE-6DB70DBA9567}" type="datetimeFigureOut">
               <a:rPr lang="en-US" dirty="0"/>
               <a:pPr/>
-              <a:t>1/25/19</a:t>
+              <a:t>1/25/2019</a:t>
             </a:fld>
             <a:endParaRPr lang="en-US" dirty="0"/>
           </a:p>
@@ -5074,7 +5099,7 @@
             <a:fld id="{B61BEF0D-F0BB-DE4B-95CE-6DB70DBA9567}" type="datetimeFigureOut">
               <a:rPr lang="en-US" dirty="0"/>
               <a:pPr/>
-              <a:t>1/25/19</a:t>
+              <a:t>1/25/2019</a:t>
             </a:fld>
             <a:endParaRPr lang="en-US" dirty="0"/>
           </a:p>
@@ -5367,7 +5392,7 @@
             <a:fld id="{B61BEF0D-F0BB-DE4B-95CE-6DB70DBA9567}" type="datetimeFigureOut">
               <a:rPr lang="en-US" dirty="0"/>
               <a:pPr/>
-              <a:t>1/25/19</a:t>
+              <a:t>1/25/2019</a:t>
             </a:fld>
             <a:endParaRPr lang="en-US" dirty="0"/>
           </a:p>
@@ -5571,7 +5596,7 @@
             <a:fld id="{B61BEF0D-F0BB-DE4B-95CE-6DB70DBA9567}" type="datetimeFigureOut">
               <a:rPr lang="en-US" dirty="0"/>
               <a:pPr/>
-              <a:t>1/25/19</a:t>
+              <a:t>1/25/2019</a:t>
             </a:fld>
             <a:endParaRPr lang="en-US" dirty="0"/>
           </a:p>
@@ -6387,7 +6412,7 @@
           <a:p>
             <a:r>
               <a:rPr lang="de-DE" dirty="0"/>
-              <a:t>D_GELB_KI1818</a:t>
+              <a:t>D_GELB_KI1819</a:t>
             </a:r>
           </a:p>
         </p:txBody>
@@ -6571,7 +6596,7 @@
           <a:p>
             <a:r>
               <a:rPr lang="de-DE" dirty="0"/>
-              <a:t>Immer zwischen 0 cm  und 20 cm nach vorne</a:t>
+              <a:t>Immer zwischen 5 cm  und 20 cm nach vorne</a:t>
             </a:r>
           </a:p>
           <a:p>
@@ -6583,8 +6608,13 @@
           <a:p>
             <a:r>
               <a:rPr lang="de-DE" dirty="0"/>
-              <a:t>Abbruch-Bedingung: Wenn alle Partikel eine Wahrscheinlichkeit &gt; 95%</a:t>
+              <a:t>Abbruch-Bedingung</a:t>
             </a:r>
+            <a:r>
+              <a:rPr lang="de-DE"/>
+              <a:t>: Ø Aller Gewichte &gt; 0.94</a:t>
+            </a:r>
+            <a:endParaRPr lang="de-DE" dirty="0"/>
           </a:p>
         </p:txBody>
       </p:sp>
@@ -6686,8 +6716,8 @@
           </a:p>
         </p:txBody>
       </p:sp>
-      <mc:AlternateContent xmlns:mc="http://schemas.openxmlformats.org/markup-compatibility/2006">
-        <mc:Choice xmlns:a14="http://schemas.microsoft.com/office/drawing/2010/main" Requires="a14">
+      <mc:AlternateContent xmlns:mc="http://schemas.openxmlformats.org/markup-compatibility/2006" xmlns:a14="http://schemas.microsoft.com/office/drawing/2010/main">
+        <mc:Choice Requires="a14">
           <p:sp>
             <p:nvSpPr>
               <p:cNvPr id="4" name="Textfeld 3">
@@ -6716,6 +6746,7 @@
               </a:bodyPr>
               <a:lstStyle/>
               <a:p>
+                <a:pPr/>
                 <a14:m>
                   <m:oMathPara xmlns:m="http://schemas.openxmlformats.org/officeDocument/2006/math">
                     <m:oMathParaPr>
@@ -6811,7 +6842,7 @@
             </p:txBody>
           </p:sp>
         </mc:Choice>
-        <mc:Fallback>
+        <mc:Fallback xmlns="">
           <p:sp>
             <p:nvSpPr>
               <p:cNvPr id="4" name="Textfeld 3">
@@ -7092,7 +7123,22 @@
           <a:p>
             <a:r>
               <a:rPr lang="de-DE" dirty="0"/>
-              <a:t>Beliefe/Gewicht bestimmt Transparenz</a:t>
+              <a:t>Beliefe/Gewicht Bestimmt die Deckkraft (Deckkraft = </a:t>
+            </a:r>
+            <a:r>
+              <a:rPr lang="de-DE" dirty="0">
+                <a:solidFill>
+                  <a:schemeClr val="accent5">
+                    <a:lumMod val="60000"/>
+                    <a:lumOff val="40000"/>
+                  </a:schemeClr>
+                </a:solidFill>
+              </a:rPr>
+              <a:t>Min(0.3 + Gewicht, 1.0)</a:t>
+            </a:r>
+            <a:r>
+              <a:rPr lang="de-DE" dirty="0"/>
+              <a:t>)</a:t>
             </a:r>
           </a:p>
           <a:p>

</xml_diff>